<commit_message>
updating Mondays object into slides
</commit_message>
<xml_diff>
--- a/ClassMaterials/ObjectIntroAndMisc/Slides/Part1-DocumentingCode.pptx
+++ b/ClassMaterials/ObjectIntroAndMisc/Slides/Part1-DocumentingCode.pptx
@@ -376,7 +376,7 @@
           <a:p>
             <a:fld id="{73386005-8F80-1A49-87D1-22EBFA47E352}" type="datetimeFigureOut">
               <a:rPr lang="en-US" smtClean="0"/>
-              <a:t>11/22/2022</a:t>
+              <a:t>12/4/2022</a:t>
             </a:fld>
             <a:endParaRPr lang="en-US"/>
           </a:p>
@@ -1198,7 +1198,7 @@
           <a:p>
             <a:fld id="{5B07E745-2C70-2943-8487-A8F6E88ADF5E}" type="datetimeFigureOut">
               <a:rPr lang="en-US" smtClean="0"/>
-              <a:t>11/22/2022</a:t>
+              <a:t>12/4/2022</a:t>
             </a:fld>
             <a:endParaRPr lang="en-US"/>
           </a:p>
@@ -1366,7 +1366,7 @@
           <a:p>
             <a:fld id="{5B07E745-2C70-2943-8487-A8F6E88ADF5E}" type="datetimeFigureOut">
               <a:rPr lang="en-US" smtClean="0"/>
-              <a:t>11/22/2022</a:t>
+              <a:t>12/4/2022</a:t>
             </a:fld>
             <a:endParaRPr lang="en-US"/>
           </a:p>
@@ -1544,7 +1544,7 @@
           <a:p>
             <a:fld id="{5B07E745-2C70-2943-8487-A8F6E88ADF5E}" type="datetimeFigureOut">
               <a:rPr lang="en-US" smtClean="0"/>
-              <a:t>11/22/2022</a:t>
+              <a:t>12/4/2022</a:t>
             </a:fld>
             <a:endParaRPr lang="en-US"/>
           </a:p>
@@ -1712,7 +1712,7 @@
           <a:p>
             <a:fld id="{5B07E745-2C70-2943-8487-A8F6E88ADF5E}" type="datetimeFigureOut">
               <a:rPr lang="en-US" smtClean="0"/>
-              <a:t>11/22/2022</a:t>
+              <a:t>12/4/2022</a:t>
             </a:fld>
             <a:endParaRPr lang="en-US"/>
           </a:p>
@@ -1957,7 +1957,7 @@
           <a:p>
             <a:fld id="{5B07E745-2C70-2943-8487-A8F6E88ADF5E}" type="datetimeFigureOut">
               <a:rPr lang="en-US" smtClean="0"/>
-              <a:t>11/22/2022</a:t>
+              <a:t>12/4/2022</a:t>
             </a:fld>
             <a:endParaRPr lang="en-US"/>
           </a:p>
@@ -2242,7 +2242,7 @@
           <a:p>
             <a:fld id="{5B07E745-2C70-2943-8487-A8F6E88ADF5E}" type="datetimeFigureOut">
               <a:rPr lang="en-US" smtClean="0"/>
-              <a:t>11/22/2022</a:t>
+              <a:t>12/4/2022</a:t>
             </a:fld>
             <a:endParaRPr lang="en-US"/>
           </a:p>
@@ -2661,7 +2661,7 @@
           <a:p>
             <a:fld id="{5B07E745-2C70-2943-8487-A8F6E88ADF5E}" type="datetimeFigureOut">
               <a:rPr lang="en-US" smtClean="0"/>
-              <a:t>11/22/2022</a:t>
+              <a:t>12/4/2022</a:t>
             </a:fld>
             <a:endParaRPr lang="en-US"/>
           </a:p>
@@ -2778,7 +2778,7 @@
           <a:p>
             <a:fld id="{5B07E745-2C70-2943-8487-A8F6E88ADF5E}" type="datetimeFigureOut">
               <a:rPr lang="en-US" smtClean="0"/>
-              <a:t>11/22/2022</a:t>
+              <a:t>12/4/2022</a:t>
             </a:fld>
             <a:endParaRPr lang="en-US"/>
           </a:p>
@@ -2873,7 +2873,7 @@
           <a:p>
             <a:fld id="{5B07E745-2C70-2943-8487-A8F6E88ADF5E}" type="datetimeFigureOut">
               <a:rPr lang="en-US" smtClean="0"/>
-              <a:t>11/22/2022</a:t>
+              <a:t>12/4/2022</a:t>
             </a:fld>
             <a:endParaRPr lang="en-US"/>
           </a:p>
@@ -3148,7 +3148,7 @@
           <a:p>
             <a:fld id="{5B07E745-2C70-2943-8487-A8F6E88ADF5E}" type="datetimeFigureOut">
               <a:rPr lang="en-US" smtClean="0"/>
-              <a:t>11/22/2022</a:t>
+              <a:t>12/4/2022</a:t>
             </a:fld>
             <a:endParaRPr lang="en-US"/>
           </a:p>
@@ -3400,7 +3400,7 @@
           <a:p>
             <a:fld id="{5B07E745-2C70-2943-8487-A8F6E88ADF5E}" type="datetimeFigureOut">
               <a:rPr lang="en-US" smtClean="0"/>
-              <a:t>11/22/2022</a:t>
+              <a:t>12/4/2022</a:t>
             </a:fld>
             <a:endParaRPr lang="en-US"/>
           </a:p>
@@ -3611,7 +3611,7 @@
           <a:p>
             <a:fld id="{5B07E745-2C70-2943-8487-A8F6E88ADF5E}" type="datetimeFigureOut">
               <a:rPr lang="en-US" smtClean="0"/>
-              <a:t>11/22/2022</a:t>
+              <a:t>12/4/2022</a:t>
             </a:fld>
             <a:endParaRPr lang="en-US"/>
           </a:p>
@@ -4159,13 +4159,18 @@
           </a:p>
           <a:p>
             <a:r>
-              <a:rPr lang="en-US" sz="4400" dirty="0">
+              <a:rPr lang="en-US" sz="4400">
                 <a:highlight>
                   <a:srgbClr val="FFFF00"/>
                 </a:highlight>
               </a:rPr>
               <a:t>__________</a:t>
             </a:r>
+            <a:endParaRPr lang="en-US" sz="4400" dirty="0">
+              <a:highlight>
+                <a:srgbClr val="FFFF00"/>
+              </a:highlight>
+            </a:endParaRPr>
           </a:p>
         </p:txBody>
       </p:sp>
@@ -4666,7 +4671,7 @@
             <a:effectLst/>
             <a:extLst>
               <a:ext uri="{C572A759-6A51-4108-AA02-DFA0A04FC94B}">
-                <ma14:wrappingTextBoxFlag xmlns:ma14="http://schemas.microsoft.com/office/mac/drawingml/2011/main" xmlns="" val="1"/>
+                <ma14:wrappingTextBoxFlag xmlns="" xmlns:ma14="http://schemas.microsoft.com/office/mac/drawingml/2011/main" val="1"/>
               </a:ext>
             </a:extLst>
           </p:spPr>
@@ -5436,7 +5441,7 @@
           </a:ln>
           <a:extLst>
             <a:ext uri="{C572A759-6A51-4108-AA02-DFA0A04FC94B}">
-              <ma14:wrappingTextBoxFlag xmlns:ma14="http://schemas.microsoft.com/office/mac/drawingml/2011/main" xmlns="" val="1"/>
+              <ma14:wrappingTextBoxFlag xmlns="" xmlns:ma14="http://schemas.microsoft.com/office/mac/drawingml/2011/main" val="1"/>
             </a:ext>
           </a:extLst>
         </p:spPr>
@@ -6095,7 +6100,7 @@
             <a:effectLst/>
             <a:extLst>
               <a:ext uri="{C572A759-6A51-4108-AA02-DFA0A04FC94B}">
-                <ma14:wrappingTextBoxFlag xmlns:ma14="http://schemas.microsoft.com/office/mac/drawingml/2011/main" xmlns="" val="1"/>
+                <ma14:wrappingTextBoxFlag xmlns="" xmlns:ma14="http://schemas.microsoft.com/office/mac/drawingml/2011/main" val="1"/>
               </a:ext>
             </a:extLst>
           </p:spPr>
@@ -7015,21 +7020,6 @@
 </file>
 
 <file path=customXml/item1.xml><?xml version="1.0" encoding="utf-8"?>
-<p:properties xmlns:p="http://schemas.microsoft.com/office/2006/metadata/properties" xmlns:xsi="http://www.w3.org/2001/XMLSchema-instance" xmlns:pc="http://schemas.microsoft.com/office/infopath/2007/PartnerControls">
-  <documentManagement/>
-</p:properties>
-</file>
-
-<file path=customXml/item2.xml><?xml version="1.0" encoding="utf-8"?>
-<?mso-contentType ?>
-<FormTemplates xmlns="http://schemas.microsoft.com/sharepoint/v3/contenttype/forms">
-  <Display>DocumentLibraryForm</Display>
-  <Edit>DocumentLibraryForm</Edit>
-  <New>DocumentLibraryForm</New>
-</FormTemplates>
-</file>
-
-<file path=customXml/item3.xml><?xml version="1.0" encoding="utf-8"?>
 <ct:contentTypeSchema xmlns:ct="http://schemas.microsoft.com/office/2006/metadata/contentType" xmlns:ma="http://schemas.microsoft.com/office/2006/metadata/properties/metaAttributes" ct:_="" ma:_="" ma:contentTypeName="Document" ma:contentTypeID="0x0101004285D81DBE5F5A448E892B34D6B8CF20" ma:contentTypeVersion="2" ma:contentTypeDescription="Create a new document." ma:contentTypeScope="" ma:versionID="026ccaf10de5d9915dfa48c6db16b59b">
   <xsd:schema xmlns:xsd="http://www.w3.org/2001/XMLSchema" xmlns:xs="http://www.w3.org/2001/XMLSchema" xmlns:p="http://schemas.microsoft.com/office/2006/metadata/properties" xmlns:ns2="08600313-7276-4ca7-b5d3-7d86193ee0ac" targetNamespace="http://schemas.microsoft.com/office/2006/metadata/properties" ma:root="true" ma:fieldsID="c887e4ee215f388544e22a2030d7ea35" ns2:_="">
     <xsd:import namespace="08600313-7276-4ca7-b5d3-7d86193ee0ac"/>
@@ -7161,24 +7151,22 @@
 </ct:contentTypeSchema>
 </file>
 
-<file path=customXml/itemProps1.xml><?xml version="1.0" encoding="utf-8"?>
-<ds:datastoreItem xmlns:ds="http://schemas.openxmlformats.org/officeDocument/2006/customXml" ds:itemID="{F97763C6-34AC-4EBA-9781-B781EFEF16EB}">
-  <ds:schemaRefs>
-    <ds:schemaRef ds:uri="http://schemas.microsoft.com/office/2006/metadata/properties"/>
-    <ds:schemaRef ds:uri="http://schemas.microsoft.com/office/infopath/2007/PartnerControls"/>
-  </ds:schemaRefs>
-</ds:datastoreItem>
+<file path=customXml/item2.xml><?xml version="1.0" encoding="utf-8"?>
+<?mso-contentType ?>
+<FormTemplates xmlns="http://schemas.microsoft.com/sharepoint/v3/contenttype/forms">
+  <Display>DocumentLibraryForm</Display>
+  <Edit>DocumentLibraryForm</Edit>
+  <New>DocumentLibraryForm</New>
+</FormTemplates>
 </file>
 
-<file path=customXml/itemProps2.xml><?xml version="1.0" encoding="utf-8"?>
-<ds:datastoreItem xmlns:ds="http://schemas.openxmlformats.org/officeDocument/2006/customXml" ds:itemID="{F6D2D98F-7772-4D77-9EAD-84CA989E91DC}">
-  <ds:schemaRefs>
-    <ds:schemaRef ds:uri="http://schemas.microsoft.com/sharepoint/v3/contenttype/forms"/>
-  </ds:schemaRefs>
-</ds:datastoreItem>
+<file path=customXml/item3.xml><?xml version="1.0" encoding="utf-8"?>
+<p:properties xmlns:p="http://schemas.microsoft.com/office/2006/metadata/properties" xmlns:xsi="http://www.w3.org/2001/XMLSchema-instance" xmlns:pc="http://schemas.microsoft.com/office/infopath/2007/PartnerControls">
+  <documentManagement/>
+</p:properties>
 </file>
 
-<file path=customXml/itemProps3.xml><?xml version="1.0" encoding="utf-8"?>
+<file path=customXml/itemProps1.xml><?xml version="1.0" encoding="utf-8"?>
 <ds:datastoreItem xmlns:ds="http://schemas.openxmlformats.org/officeDocument/2006/customXml" ds:itemID="{6C423C04-D2F3-4811-BE3A-D038CC72103B}">
   <ds:schemaRefs>
     <ds:schemaRef ds:uri="http://schemas.microsoft.com/office/2006/metadata/contentType"/>
@@ -7194,4 +7182,21 @@
     <ds:schemaRef ds:uri="http://schemas.microsoft.com/internal/obd"/>
   </ds:schemaRefs>
 </ds:datastoreItem>
+</file>
+
+<file path=customXml/itemProps2.xml><?xml version="1.0" encoding="utf-8"?>
+<ds:datastoreItem xmlns:ds="http://schemas.openxmlformats.org/officeDocument/2006/customXml" ds:itemID="{F6D2D98F-7772-4D77-9EAD-84CA989E91DC}">
+  <ds:schemaRefs>
+    <ds:schemaRef ds:uri="http://schemas.microsoft.com/sharepoint/v3/contenttype/forms"/>
+  </ds:schemaRefs>
+</ds:datastoreItem>
+</file>
+
+<file path=customXml/itemProps3.xml><?xml version="1.0" encoding="utf-8"?>
+<ds:datastoreItem xmlns:ds="http://schemas.openxmlformats.org/officeDocument/2006/customXml" ds:itemID="{F97763C6-34AC-4EBA-9781-B781EFEF16EB}">
+  <ds:schemaRefs>
+    <ds:schemaRef ds:uri="http://schemas.microsoft.com/office/2006/metadata/properties"/>
+    <ds:schemaRef ds:uri="http://schemas.microsoft.com/office/infopath/2007/PartnerControls"/>
+  </ds:schemaRefs>
+</ds:datastoreItem>
 </file>
</xml_diff>

<commit_message>
final tweaks to object intro slides
</commit_message>
<xml_diff>
--- a/ClassMaterials/ObjectIntroAndMisc/Slides/Part1-DocumentingCode.pptx
+++ b/ClassMaterials/ObjectIntroAndMisc/Slides/Part1-DocumentingCode.pptx
@@ -7020,6 +7020,21 @@
 </file>
 
 <file path=customXml/item1.xml><?xml version="1.0" encoding="utf-8"?>
+<?mso-contentType ?>
+<FormTemplates xmlns="http://schemas.microsoft.com/sharepoint/v3/contenttype/forms">
+  <Display>DocumentLibraryForm</Display>
+  <Edit>DocumentLibraryForm</Edit>
+  <New>DocumentLibraryForm</New>
+</FormTemplates>
+</file>
+
+<file path=customXml/item2.xml><?xml version="1.0" encoding="utf-8"?>
+<p:properties xmlns:p="http://schemas.microsoft.com/office/2006/metadata/properties" xmlns:xsi="http://www.w3.org/2001/XMLSchema-instance" xmlns:pc="http://schemas.microsoft.com/office/infopath/2007/PartnerControls">
+  <documentManagement/>
+</p:properties>
+</file>
+
+<file path=customXml/item3.xml><?xml version="1.0" encoding="utf-8"?>
 <ct:contentTypeSchema xmlns:ct="http://schemas.microsoft.com/office/2006/metadata/contentType" xmlns:ma="http://schemas.microsoft.com/office/2006/metadata/properties/metaAttributes" ct:_="" ma:_="" ma:contentTypeName="Document" ma:contentTypeID="0x0101004285D81DBE5F5A448E892B34D6B8CF20" ma:contentTypeVersion="2" ma:contentTypeDescription="Create a new document." ma:contentTypeScope="" ma:versionID="026ccaf10de5d9915dfa48c6db16b59b">
   <xsd:schema xmlns:xsd="http://www.w3.org/2001/XMLSchema" xmlns:xs="http://www.w3.org/2001/XMLSchema" xmlns:p="http://schemas.microsoft.com/office/2006/metadata/properties" xmlns:ns2="08600313-7276-4ca7-b5d3-7d86193ee0ac" targetNamespace="http://schemas.microsoft.com/office/2006/metadata/properties" ma:root="true" ma:fieldsID="c887e4ee215f388544e22a2030d7ea35" ns2:_="">
     <xsd:import namespace="08600313-7276-4ca7-b5d3-7d86193ee0ac"/>
@@ -7151,22 +7166,24 @@
 </ct:contentTypeSchema>
 </file>
 
-<file path=customXml/item2.xml><?xml version="1.0" encoding="utf-8"?>
-<?mso-contentType ?>
-<FormTemplates xmlns="http://schemas.microsoft.com/sharepoint/v3/contenttype/forms">
-  <Display>DocumentLibraryForm</Display>
-  <Edit>DocumentLibraryForm</Edit>
-  <New>DocumentLibraryForm</New>
-</FormTemplates>
+<file path=customXml/itemProps1.xml><?xml version="1.0" encoding="utf-8"?>
+<ds:datastoreItem xmlns:ds="http://schemas.openxmlformats.org/officeDocument/2006/customXml" ds:itemID="{F6D2D98F-7772-4D77-9EAD-84CA989E91DC}">
+  <ds:schemaRefs>
+    <ds:schemaRef ds:uri="http://schemas.microsoft.com/sharepoint/v3/contenttype/forms"/>
+  </ds:schemaRefs>
+</ds:datastoreItem>
 </file>
 
-<file path=customXml/item3.xml><?xml version="1.0" encoding="utf-8"?>
-<p:properties xmlns:p="http://schemas.microsoft.com/office/2006/metadata/properties" xmlns:xsi="http://www.w3.org/2001/XMLSchema-instance" xmlns:pc="http://schemas.microsoft.com/office/infopath/2007/PartnerControls">
-  <documentManagement/>
-</p:properties>
+<file path=customXml/itemProps2.xml><?xml version="1.0" encoding="utf-8"?>
+<ds:datastoreItem xmlns:ds="http://schemas.openxmlformats.org/officeDocument/2006/customXml" ds:itemID="{F97763C6-34AC-4EBA-9781-B781EFEF16EB}">
+  <ds:schemaRefs>
+    <ds:schemaRef ds:uri="http://schemas.microsoft.com/office/2006/metadata/properties"/>
+    <ds:schemaRef ds:uri="http://schemas.microsoft.com/office/infopath/2007/PartnerControls"/>
+  </ds:schemaRefs>
+</ds:datastoreItem>
 </file>
 
-<file path=customXml/itemProps1.xml><?xml version="1.0" encoding="utf-8"?>
+<file path=customXml/itemProps3.xml><?xml version="1.0" encoding="utf-8"?>
 <ds:datastoreItem xmlns:ds="http://schemas.openxmlformats.org/officeDocument/2006/customXml" ds:itemID="{6C423C04-D2F3-4811-BE3A-D038CC72103B}">
   <ds:schemaRefs>
     <ds:schemaRef ds:uri="http://schemas.microsoft.com/office/2006/metadata/contentType"/>
@@ -7182,21 +7199,4 @@
     <ds:schemaRef ds:uri="http://schemas.microsoft.com/internal/obd"/>
   </ds:schemaRefs>
 </ds:datastoreItem>
-</file>
-
-<file path=customXml/itemProps2.xml><?xml version="1.0" encoding="utf-8"?>
-<ds:datastoreItem xmlns:ds="http://schemas.openxmlformats.org/officeDocument/2006/customXml" ds:itemID="{F6D2D98F-7772-4D77-9EAD-84CA989E91DC}">
-  <ds:schemaRefs>
-    <ds:schemaRef ds:uri="http://schemas.microsoft.com/sharepoint/v3/contenttype/forms"/>
-  </ds:schemaRefs>
-</ds:datastoreItem>
-</file>
-
-<file path=customXml/itemProps3.xml><?xml version="1.0" encoding="utf-8"?>
-<ds:datastoreItem xmlns:ds="http://schemas.openxmlformats.org/officeDocument/2006/customXml" ds:itemID="{F97763C6-34AC-4EBA-9781-B781EFEF16EB}">
-  <ds:schemaRefs>
-    <ds:schemaRef ds:uri="http://schemas.microsoft.com/office/2006/metadata/properties"/>
-    <ds:schemaRef ds:uri="http://schemas.microsoft.com/office/infopath/2007/PartnerControls"/>
-  </ds:schemaRefs>
-</ds:datastoreItem>
 </file>
</xml_diff>

<commit_message>
adding clarification on javadocs vs. inline comments
</commit_message>
<xml_diff>
--- a/ClassMaterials/ObjectIntroAndMisc/Slides/Part1-DocumentingCode.pptx
+++ b/ClassMaterials/ObjectIntroAndMisc/Slides/Part1-DocumentingCode.pptx
@@ -424,7 +424,7 @@
           <a:p>
             <a:fld id="{73386005-8F80-1A49-87D1-22EBFA47E352}" type="datetimeFigureOut">
               <a:rPr lang="en-US" smtClean="0"/>
-              <a:t>11/21/2023</a:t>
+              <a:t>12/3/2023</a:t>
             </a:fld>
             <a:endParaRPr lang="en-US"/>
           </a:p>
@@ -710,29 +710,19 @@
       </p:grpSpPr>
       <p:sp>
         <p:nvSpPr>
-          <p:cNvPr id="39938" name="Slide Image Placeholder 1"/>
-          <p:cNvSpPr>
-            <a:spLocks noGrp="1" noRot="1" noChangeAspect="1" noTextEdit="1"/>
+          <p:cNvPr id="2" name="Slide Image Placeholder 1"/>
+          <p:cNvSpPr>
+            <a:spLocks noGrp="1" noRot="1" noChangeAspect="1"/>
           </p:cNvSpPr>
           <p:nvPr>
             <p:ph type="sldImg"/>
           </p:nvPr>
         </p:nvSpPr>
-        <p:spPr bwMode="auto">
-          <a:noFill/>
-          <a:ln>
-            <a:solidFill>
-              <a:srgbClr val="000000"/>
-            </a:solidFill>
-            <a:miter lim="800000"/>
-            <a:headEnd/>
-            <a:tailEnd/>
-          </a:ln>
-        </p:spPr>
-      </p:sp>
-      <p:sp>
-        <p:nvSpPr>
-          <p:cNvPr id="39939" name="Notes Placeholder 2"/>
+        <p:spPr/>
+      </p:sp>
+      <p:sp>
+        <p:nvSpPr>
+          <p:cNvPr id="3" name="Notes Placeholder 2"/>
           <p:cNvSpPr>
             <a:spLocks noGrp="1"/>
           </p:cNvSpPr>
@@ -740,21 +730,41 @@
             <p:ph type="body" idx="1"/>
           </p:nvPr>
         </p:nvSpPr>
-        <p:spPr>
-          <a:noFill/>
-          <a:ln/>
-        </p:spPr>
+        <p:spPr/>
         <p:txBody>
           <a:bodyPr/>
           <a:lstStyle/>
           <a:p>
+            <a:pPr marL="0" marR="0" lvl="0" indent="0" algn="l" defTabSz="457200" rtl="0" eaLnBrk="1" fontAlgn="auto" latinLnBrk="0" hangingPunct="1">
+              <a:lnSpc>
+                <a:spcPct val="100000"/>
+              </a:lnSpc>
+              <a:spcBef>
+                <a:spcPts val="0"/>
+              </a:spcBef>
+              <a:spcAft>
+                <a:spcPts val="0"/>
+              </a:spcAft>
+              <a:buClrTx/>
+              <a:buSzTx/>
+              <a:buFontTx/>
+              <a:buNone/>
+              <a:tabLst/>
+              <a:defRPr/>
+            </a:pPr>
+            <a:r>
+              <a:rPr lang="en-US" dirty="0"/>
+              <a:t>JAY: Introduce THIRD row today (Identity Pie)</a:t>
+            </a:r>
+          </a:p>
+          <a:p>
             <a:endParaRPr lang="en-US" dirty="0"/>
           </a:p>
         </p:txBody>
       </p:sp>
       <p:sp>
         <p:nvSpPr>
-          <p:cNvPr id="39940" name="Slide Number Placeholder 3"/>
+          <p:cNvPr id="4" name="Slide Number Placeholder 3"/>
           <p:cNvSpPr>
             <a:spLocks noGrp="1"/>
           </p:cNvSpPr>
@@ -762,30 +772,23 @@
             <p:ph type="sldNum" sz="quarter" idx="5"/>
           </p:nvPr>
         </p:nvSpPr>
-        <p:spPr>
-          <a:noFill/>
-        </p:spPr>
+        <p:spPr/>
         <p:txBody>
           <a:bodyPr/>
           <a:lstStyle/>
           <a:p>
-            <a:fld id="{FF5ECE29-E6DA-4119-8DF5-41CFF6D7EB31}" type="slidenum">
-              <a:rPr lang="en-US" smtClean="0">
-                <a:cs typeface="Arial" pitchFamily="34" charset="0"/>
-              </a:rPr>
-              <a:pPr/>
-              <a:t>2</a:t>
+            <a:fld id="{9B5CF600-4147-7540-9DE4-6C8272E0EDC3}" type="slidenum">
+              <a:rPr lang="en-US" smtClean="0"/>
+              <a:t>1</a:t>
             </a:fld>
-            <a:endParaRPr lang="en-US">
-              <a:cs typeface="Arial" pitchFamily="34" charset="0"/>
-            </a:endParaRPr>
+            <a:endParaRPr lang="en-US"/>
           </a:p>
         </p:txBody>
       </p:sp>
     </p:spTree>
     <p:extLst>
       <p:ext uri="{BB962C8B-B14F-4D97-AF65-F5344CB8AC3E}">
-        <p14:creationId xmlns:p14="http://schemas.microsoft.com/office/powerpoint/2010/main" val="3033898265"/>
+        <p14:creationId xmlns:p14="http://schemas.microsoft.com/office/powerpoint/2010/main" val="284568196"/>
       </p:ext>
     </p:extLst>
   </p:cSld>
@@ -878,7 +881,7 @@
                 <a:cs typeface="Arial" pitchFamily="34" charset="0"/>
               </a:rPr>
               <a:pPr/>
-              <a:t>3</a:t>
+              <a:t>2</a:t>
             </a:fld>
             <a:endParaRPr lang="en-US">
               <a:cs typeface="Arial" pitchFamily="34" charset="0"/>
@@ -889,7 +892,7 @@
     </p:spTree>
     <p:extLst>
       <p:ext uri="{BB962C8B-B14F-4D97-AF65-F5344CB8AC3E}">
-        <p14:creationId xmlns:p14="http://schemas.microsoft.com/office/powerpoint/2010/main" val="4072322229"/>
+        <p14:creationId xmlns:p14="http://schemas.microsoft.com/office/powerpoint/2010/main" val="3033898265"/>
       </p:ext>
     </p:extLst>
   </p:cSld>
@@ -918,6 +921,110 @@
       </p:grpSpPr>
       <p:sp>
         <p:nvSpPr>
+          <p:cNvPr id="39938" name="Slide Image Placeholder 1"/>
+          <p:cNvSpPr>
+            <a:spLocks noGrp="1" noRot="1" noChangeAspect="1" noTextEdit="1"/>
+          </p:cNvSpPr>
+          <p:nvPr>
+            <p:ph type="sldImg"/>
+          </p:nvPr>
+        </p:nvSpPr>
+        <p:spPr bwMode="auto">
+          <a:noFill/>
+          <a:ln>
+            <a:solidFill>
+              <a:srgbClr val="000000"/>
+            </a:solidFill>
+            <a:miter lim="800000"/>
+            <a:headEnd/>
+            <a:tailEnd/>
+          </a:ln>
+        </p:spPr>
+      </p:sp>
+      <p:sp>
+        <p:nvSpPr>
+          <p:cNvPr id="39939" name="Notes Placeholder 2"/>
+          <p:cNvSpPr>
+            <a:spLocks noGrp="1"/>
+          </p:cNvSpPr>
+          <p:nvPr>
+            <p:ph type="body" idx="1"/>
+          </p:nvPr>
+        </p:nvSpPr>
+        <p:spPr>
+          <a:noFill/>
+          <a:ln/>
+        </p:spPr>
+        <p:txBody>
+          <a:bodyPr/>
+          <a:lstStyle/>
+          <a:p>
+            <a:endParaRPr lang="en-US" dirty="0"/>
+          </a:p>
+        </p:txBody>
+      </p:sp>
+      <p:sp>
+        <p:nvSpPr>
+          <p:cNvPr id="39940" name="Slide Number Placeholder 3"/>
+          <p:cNvSpPr>
+            <a:spLocks noGrp="1"/>
+          </p:cNvSpPr>
+          <p:nvPr>
+            <p:ph type="sldNum" sz="quarter" idx="5"/>
+          </p:nvPr>
+        </p:nvSpPr>
+        <p:spPr>
+          <a:noFill/>
+        </p:spPr>
+        <p:txBody>
+          <a:bodyPr/>
+          <a:lstStyle/>
+          <a:p>
+            <a:fld id="{FF5ECE29-E6DA-4119-8DF5-41CFF6D7EB31}" type="slidenum">
+              <a:rPr lang="en-US" smtClean="0">
+                <a:cs typeface="Arial" pitchFamily="34" charset="0"/>
+              </a:rPr>
+              <a:pPr/>
+              <a:t>3</a:t>
+            </a:fld>
+            <a:endParaRPr lang="en-US">
+              <a:cs typeface="Arial" pitchFamily="34" charset="0"/>
+            </a:endParaRPr>
+          </a:p>
+        </p:txBody>
+      </p:sp>
+    </p:spTree>
+    <p:extLst>
+      <p:ext uri="{BB962C8B-B14F-4D97-AF65-F5344CB8AC3E}">
+        <p14:creationId xmlns:p14="http://schemas.microsoft.com/office/powerpoint/2010/main" val="4072322229"/>
+      </p:ext>
+    </p:extLst>
+  </p:cSld>
+  <p:clrMapOvr>
+    <a:masterClrMapping/>
+  </p:clrMapOvr>
+</p:notes>
+</file>
+
+<file path=ppt/notesSlides/notesSlide4.xml><?xml version="1.0" encoding="utf-8"?>
+<p:notes xmlns:a="http://schemas.openxmlformats.org/drawingml/2006/main" xmlns:r="http://schemas.openxmlformats.org/officeDocument/2006/relationships" xmlns:p="http://schemas.openxmlformats.org/presentationml/2006/main">
+  <p:cSld>
+    <p:spTree>
+      <p:nvGrpSpPr>
+        <p:cNvPr id="1" name=""/>
+        <p:cNvGrpSpPr/>
+        <p:nvPr/>
+      </p:nvGrpSpPr>
+      <p:grpSpPr>
+        <a:xfrm>
+          <a:off x="0" y="0"/>
+          <a:ext cx="0" cy="0"/>
+          <a:chOff x="0" y="0"/>
+          <a:chExt cx="0" cy="0"/>
+        </a:xfrm>
+      </p:grpSpPr>
+      <p:sp>
+        <p:nvSpPr>
           <p:cNvPr id="164" name="Shape 164"/>
           <p:cNvSpPr>
             <a:spLocks noGrp="1" noRot="1" noChangeAspect="1"/>
@@ -979,7 +1086,7 @@
 </p:notes>
 </file>
 
-<file path=ppt/notesSlides/notesSlide4.xml><?xml version="1.0" encoding="utf-8"?>
+<file path=ppt/notesSlides/notesSlide5.xml><?xml version="1.0" encoding="utf-8"?>
 <p:notes xmlns:a="http://schemas.openxmlformats.org/drawingml/2006/main" xmlns:r="http://schemas.openxmlformats.org/officeDocument/2006/relationships" xmlns:p="http://schemas.openxmlformats.org/presentationml/2006/main">
   <p:cSld>
     <p:spTree>
@@ -1246,7 +1353,7 @@
           <a:p>
             <a:fld id="{5B07E745-2C70-2943-8487-A8F6E88ADF5E}" type="datetimeFigureOut">
               <a:rPr lang="en-US" smtClean="0"/>
-              <a:t>11/21/2023</a:t>
+              <a:t>12/3/2023</a:t>
             </a:fld>
             <a:endParaRPr lang="en-US"/>
           </a:p>
@@ -1414,7 +1521,7 @@
           <a:p>
             <a:fld id="{5B07E745-2C70-2943-8487-A8F6E88ADF5E}" type="datetimeFigureOut">
               <a:rPr lang="en-US" smtClean="0"/>
-              <a:t>11/21/2023</a:t>
+              <a:t>12/3/2023</a:t>
             </a:fld>
             <a:endParaRPr lang="en-US"/>
           </a:p>
@@ -1592,7 +1699,7 @@
           <a:p>
             <a:fld id="{5B07E745-2C70-2943-8487-A8F6E88ADF5E}" type="datetimeFigureOut">
               <a:rPr lang="en-US" smtClean="0"/>
-              <a:t>11/21/2023</a:t>
+              <a:t>12/3/2023</a:t>
             </a:fld>
             <a:endParaRPr lang="en-US"/>
           </a:p>
@@ -1760,7 +1867,7 @@
           <a:p>
             <a:fld id="{5B07E745-2C70-2943-8487-A8F6E88ADF5E}" type="datetimeFigureOut">
               <a:rPr lang="en-US" smtClean="0"/>
-              <a:t>11/21/2023</a:t>
+              <a:t>12/3/2023</a:t>
             </a:fld>
             <a:endParaRPr lang="en-US"/>
           </a:p>
@@ -2005,7 +2112,7 @@
           <a:p>
             <a:fld id="{5B07E745-2C70-2943-8487-A8F6E88ADF5E}" type="datetimeFigureOut">
               <a:rPr lang="en-US" smtClean="0"/>
-              <a:t>11/21/2023</a:t>
+              <a:t>12/3/2023</a:t>
             </a:fld>
             <a:endParaRPr lang="en-US"/>
           </a:p>
@@ -2290,7 +2397,7 @@
           <a:p>
             <a:fld id="{5B07E745-2C70-2943-8487-A8F6E88ADF5E}" type="datetimeFigureOut">
               <a:rPr lang="en-US" smtClean="0"/>
-              <a:t>11/21/2023</a:t>
+              <a:t>12/3/2023</a:t>
             </a:fld>
             <a:endParaRPr lang="en-US"/>
           </a:p>
@@ -2709,7 +2816,7 @@
           <a:p>
             <a:fld id="{5B07E745-2C70-2943-8487-A8F6E88ADF5E}" type="datetimeFigureOut">
               <a:rPr lang="en-US" smtClean="0"/>
-              <a:t>11/21/2023</a:t>
+              <a:t>12/3/2023</a:t>
             </a:fld>
             <a:endParaRPr lang="en-US"/>
           </a:p>
@@ -2826,7 +2933,7 @@
           <a:p>
             <a:fld id="{5B07E745-2C70-2943-8487-A8F6E88ADF5E}" type="datetimeFigureOut">
               <a:rPr lang="en-US" smtClean="0"/>
-              <a:t>11/21/2023</a:t>
+              <a:t>12/3/2023</a:t>
             </a:fld>
             <a:endParaRPr lang="en-US"/>
           </a:p>
@@ -2921,7 +3028,7 @@
           <a:p>
             <a:fld id="{5B07E745-2C70-2943-8487-A8F6E88ADF5E}" type="datetimeFigureOut">
               <a:rPr lang="en-US" smtClean="0"/>
-              <a:t>11/21/2023</a:t>
+              <a:t>12/3/2023</a:t>
             </a:fld>
             <a:endParaRPr lang="en-US"/>
           </a:p>
@@ -3196,7 +3303,7 @@
           <a:p>
             <a:fld id="{5B07E745-2C70-2943-8487-A8F6E88ADF5E}" type="datetimeFigureOut">
               <a:rPr lang="en-US" smtClean="0"/>
-              <a:t>11/21/2023</a:t>
+              <a:t>12/3/2023</a:t>
             </a:fld>
             <a:endParaRPr lang="en-US"/>
           </a:p>
@@ -3448,7 +3555,7 @@
           <a:p>
             <a:fld id="{5B07E745-2C70-2943-8487-A8F6E88ADF5E}" type="datetimeFigureOut">
               <a:rPr lang="en-US" smtClean="0"/>
-              <a:t>11/21/2023</a:t>
+              <a:t>12/3/2023</a:t>
             </a:fld>
             <a:endParaRPr lang="en-US"/>
           </a:p>
@@ -3659,7 +3766,7 @@
           <a:p>
             <a:fld id="{5B07E745-2C70-2943-8487-A8F6E88ADF5E}" type="datetimeFigureOut">
               <a:rPr lang="en-US" smtClean="0"/>
-              <a:t>11/21/2023</a:t>
+              <a:t>12/3/2023</a:t>
             </a:fld>
             <a:endParaRPr lang="en-US"/>
           </a:p>
@@ -4298,7 +4405,7 @@
           <p:nvPr/>
         </p:nvPicPr>
         <p:blipFill>
-          <a:blip r:embed="rId2"/>
+          <a:blip r:embed="rId3"/>
           <a:stretch>
             <a:fillRect/>
           </a:stretch>
@@ -4780,7 +4887,7 @@
             <a:effectLst/>
             <a:extLst>
               <a:ext uri="{C572A759-6A51-4108-AA02-DFA0A04FC94B}">
-                <ma14:wrappingTextBoxFlag xmlns:ma14="http://schemas.microsoft.com/office/mac/drawingml/2011/main" xmlns="" val="1"/>
+                <ma14:wrappingTextBoxFlag xmlns="" xmlns:ma14="http://schemas.microsoft.com/office/mac/drawingml/2011/main" val="1"/>
               </a:ext>
             </a:extLst>
           </p:spPr>
@@ -5550,7 +5657,7 @@
           </a:ln>
           <a:extLst>
             <a:ext uri="{C572A759-6A51-4108-AA02-DFA0A04FC94B}">
-              <ma14:wrappingTextBoxFlag xmlns:ma14="http://schemas.microsoft.com/office/mac/drawingml/2011/main" xmlns="" val="1"/>
+              <ma14:wrappingTextBoxFlag xmlns="" xmlns:ma14="http://schemas.microsoft.com/office/mac/drawingml/2011/main" val="1"/>
             </a:ext>
           </a:extLst>
         </p:spPr>
@@ -5939,7 +6046,7 @@
         </p:nvSpPr>
         <p:spPr>
           <a:xfrm>
-            <a:off x="457200" y="1600200"/>
+            <a:off x="457200" y="1312935"/>
             <a:ext cx="8229600" cy="4525963"/>
           </a:xfrm>
           <a:prstGeom prst="rect">
@@ -5999,26 +6106,52 @@
               <a:defRPr sz="1800"/>
             </a:pPr>
             <a:r>
+              <a:rPr sz="2000" dirty="0" err="1"/>
+              <a:t>Javadoc</a:t>
+            </a:r>
+            <a:r>
+              <a:rPr lang="en-US" sz="2000" dirty="0" err="1"/>
+              <a:t>s</a:t>
+            </a:r>
+            <a:r>
               <a:rPr sz="2000" dirty="0"/>
-              <a:t>Javadoc comments</a:t>
+              <a:t> </a:t>
             </a:r>
             <a:r>
               <a:rPr lang="en-US" sz="2000" dirty="0"/>
-              <a:t> primarily</a:t>
-            </a:r>
-            <a:r>
-              <a:rPr sz="2000" dirty="0"/>
+              <a:t> (  </a:t>
+            </a:r>
+            <a:r>
+              <a:rPr lang="en-US" sz="2000" dirty="0">
+                <a:latin typeface="Consolas" panose="020B0609020204030204" pitchFamily="49" charset="0"/>
+              </a:rPr>
+              <a:t>/** ....  */</a:t>
+            </a:r>
+            <a:r>
+              <a:rPr lang="en-US" sz="2000" dirty="0"/>
+              <a:t>   )</a:t>
+            </a:r>
+          </a:p>
+          <a:p>
+            <a:pPr marL="1061357" lvl="2" indent="-204107">
+              <a:spcBef>
+                <a:spcPts val="400"/>
+              </a:spcBef>
+              <a:defRPr sz="1800"/>
+            </a:pPr>
+            <a:r>
+              <a:rPr lang="en-US" sz="1600" dirty="0"/>
+              <a:t>Primarily</a:t>
+            </a:r>
+            <a:r>
+              <a:rPr sz="1600" dirty="0"/>
               <a:t> for</a:t>
             </a:r>
             <a:r>
-              <a:rPr lang="en-US" sz="2000" dirty="0"/>
-              <a:t> classes</a:t>
-            </a:r>
-            <a:r>
-              <a:rPr sz="2000" dirty="0"/>
-              <a:t>.</a:t>
-            </a:r>
-            <a:endParaRPr sz="2800" dirty="0"/>
+              <a:rPr lang="en-US" sz="1600" dirty="0"/>
+              <a:t> classes, define the purpose at the top of the file</a:t>
+            </a:r>
+            <a:endParaRPr dirty="0"/>
           </a:p>
           <a:p>
             <a:pPr marL="661307" lvl="1" indent="-204107">
@@ -6028,18 +6161,40 @@
               <a:defRPr sz="1800"/>
             </a:pPr>
             <a:r>
-              <a:rPr sz="2000" dirty="0"/>
+              <a:rPr lang="en-US" sz="2000" dirty="0"/>
+              <a:t>In-line comments:  ( </a:t>
+            </a:r>
+            <a:r>
+              <a:rPr lang="en-US" sz="2000" dirty="0">
+                <a:latin typeface="Consolas" panose="020B0609020204030204" pitchFamily="49" charset="0"/>
+              </a:rPr>
+              <a:t>//add comments like this</a:t>
+            </a:r>
+            <a:r>
+              <a:rPr lang="en-US" sz="2000" dirty="0"/>
+              <a:t>   )</a:t>
+            </a:r>
+          </a:p>
+          <a:p>
+            <a:pPr marL="1061357" lvl="2" indent="-204107">
+              <a:spcBef>
+                <a:spcPts val="400"/>
+              </a:spcBef>
+              <a:defRPr sz="1800"/>
+            </a:pPr>
+            <a:r>
+              <a:rPr sz="1600" dirty="0"/>
               <a:t>Explanations of anything else that is not obvious</a:t>
             </a:r>
             <a:r>
-              <a:rPr lang="en-US" sz="2000" dirty="0"/>
+              <a:rPr lang="en-US" sz="1600" dirty="0"/>
               <a:t> in any spot</a:t>
             </a:r>
             <a:r>
-              <a:rPr sz="2000" dirty="0"/>
+              <a:rPr sz="1600" dirty="0"/>
               <a:t>.</a:t>
             </a:r>
-            <a:endParaRPr sz="2800" dirty="0"/>
+            <a:endParaRPr dirty="0"/>
           </a:p>
           <a:p>
             <a:pPr marL="257175" lvl="0" indent="-257175">
@@ -6209,7 +6364,7 @@
             <a:effectLst/>
             <a:extLst>
               <a:ext uri="{C572A759-6A51-4108-AA02-DFA0A04FC94B}">
-                <ma14:wrappingTextBoxFlag xmlns:ma14="http://schemas.microsoft.com/office/mac/drawingml/2011/main" xmlns="" val="1"/>
+                <ma14:wrappingTextBoxFlag xmlns="" xmlns:ma14="http://schemas.microsoft.com/office/mac/drawingml/2011/main" val="1"/>
               </a:ext>
             </a:extLst>
           </p:spPr>
@@ -7129,6 +7284,21 @@
 </file>
 
 <file path=customXml/item1.xml><?xml version="1.0" encoding="utf-8"?>
+<?mso-contentType ?>
+<FormTemplates xmlns="http://schemas.microsoft.com/sharepoint/v3/contenttype/forms">
+  <Display>DocumentLibraryForm</Display>
+  <Edit>DocumentLibraryForm</Edit>
+  <New>DocumentLibraryForm</New>
+</FormTemplates>
+</file>
+
+<file path=customXml/item2.xml><?xml version="1.0" encoding="utf-8"?>
+<p:properties xmlns:p="http://schemas.microsoft.com/office/2006/metadata/properties" xmlns:xsi="http://www.w3.org/2001/XMLSchema-instance" xmlns:pc="http://schemas.microsoft.com/office/infopath/2007/PartnerControls">
+  <documentManagement/>
+</p:properties>
+</file>
+
+<file path=customXml/item3.xml><?xml version="1.0" encoding="utf-8"?>
 <ct:contentTypeSchema xmlns:ct="http://schemas.microsoft.com/office/2006/metadata/contentType" xmlns:ma="http://schemas.microsoft.com/office/2006/metadata/properties/metaAttributes" ct:_="" ma:_="" ma:contentTypeName="Document" ma:contentTypeID="0x0101004285D81DBE5F5A448E892B34D6B8CF20" ma:contentTypeVersion="2" ma:contentTypeDescription="Create a new document." ma:contentTypeScope="" ma:versionID="026ccaf10de5d9915dfa48c6db16b59b">
   <xsd:schema xmlns:xsd="http://www.w3.org/2001/XMLSchema" xmlns:xs="http://www.w3.org/2001/XMLSchema" xmlns:p="http://schemas.microsoft.com/office/2006/metadata/properties" xmlns:ns2="08600313-7276-4ca7-b5d3-7d86193ee0ac" targetNamespace="http://schemas.microsoft.com/office/2006/metadata/properties" ma:root="true" ma:fieldsID="c887e4ee215f388544e22a2030d7ea35" ns2:_="">
     <xsd:import namespace="08600313-7276-4ca7-b5d3-7d86193ee0ac"/>
@@ -7260,22 +7430,24 @@
 </ct:contentTypeSchema>
 </file>
 
-<file path=customXml/item2.xml><?xml version="1.0" encoding="utf-8"?>
-<p:properties xmlns:p="http://schemas.microsoft.com/office/2006/metadata/properties" xmlns:xsi="http://www.w3.org/2001/XMLSchema-instance" xmlns:pc="http://schemas.microsoft.com/office/infopath/2007/PartnerControls">
-  <documentManagement/>
-</p:properties>
+<file path=customXml/itemProps1.xml><?xml version="1.0" encoding="utf-8"?>
+<ds:datastoreItem xmlns:ds="http://schemas.openxmlformats.org/officeDocument/2006/customXml" ds:itemID="{F6D2D98F-7772-4D77-9EAD-84CA989E91DC}">
+  <ds:schemaRefs>
+    <ds:schemaRef ds:uri="http://schemas.microsoft.com/sharepoint/v3/contenttype/forms"/>
+  </ds:schemaRefs>
+</ds:datastoreItem>
 </file>
 
-<file path=customXml/item3.xml><?xml version="1.0" encoding="utf-8"?>
-<?mso-contentType ?>
-<FormTemplates xmlns="http://schemas.microsoft.com/sharepoint/v3/contenttype/forms">
-  <Display>DocumentLibraryForm</Display>
-  <Edit>DocumentLibraryForm</Edit>
-  <New>DocumentLibraryForm</New>
-</FormTemplates>
+<file path=customXml/itemProps2.xml><?xml version="1.0" encoding="utf-8"?>
+<ds:datastoreItem xmlns:ds="http://schemas.openxmlformats.org/officeDocument/2006/customXml" ds:itemID="{F97763C6-34AC-4EBA-9781-B781EFEF16EB}">
+  <ds:schemaRefs>
+    <ds:schemaRef ds:uri="http://schemas.microsoft.com/office/2006/metadata/properties"/>
+    <ds:schemaRef ds:uri="http://schemas.microsoft.com/office/infopath/2007/PartnerControls"/>
+  </ds:schemaRefs>
+</ds:datastoreItem>
 </file>
 
-<file path=customXml/itemProps1.xml><?xml version="1.0" encoding="utf-8"?>
+<file path=customXml/itemProps3.xml><?xml version="1.0" encoding="utf-8"?>
 <ds:datastoreItem xmlns:ds="http://schemas.openxmlformats.org/officeDocument/2006/customXml" ds:itemID="{6C423C04-D2F3-4811-BE3A-D038CC72103B}">
   <ds:schemaRefs>
     <ds:schemaRef ds:uri="http://schemas.microsoft.com/office/2006/metadata/contentType"/>
@@ -7291,21 +7463,4 @@
     <ds:schemaRef ds:uri="http://schemas.microsoft.com/internal/obd"/>
   </ds:schemaRefs>
 </ds:datastoreItem>
-</file>
-
-<file path=customXml/itemProps2.xml><?xml version="1.0" encoding="utf-8"?>
-<ds:datastoreItem xmlns:ds="http://schemas.openxmlformats.org/officeDocument/2006/customXml" ds:itemID="{F97763C6-34AC-4EBA-9781-B781EFEF16EB}">
-  <ds:schemaRefs>
-    <ds:schemaRef ds:uri="http://schemas.microsoft.com/office/2006/metadata/properties"/>
-    <ds:schemaRef ds:uri="http://schemas.microsoft.com/office/infopath/2007/PartnerControls"/>
-  </ds:schemaRefs>
-</ds:datastoreItem>
-</file>
-
-<file path=customXml/itemProps3.xml><?xml version="1.0" encoding="utf-8"?>
-<ds:datastoreItem xmlns:ds="http://schemas.openxmlformats.org/officeDocument/2006/customXml" ds:itemID="{F6D2D98F-7772-4D77-9EAD-84CA989E91DC}">
-  <ds:schemaRefs>
-    <ds:schemaRef ds:uri="http://schemas.microsoft.com/sharepoint/v3/contenttype/forms"/>
-  </ds:schemaRefs>
-</ds:datastoreItem>
 </file>
</xml_diff>

<commit_message>
adding small updates to slides
</commit_message>
<xml_diff>
--- a/ClassMaterials/ObjectIntroAndMisc/Slides/Part1-DocumentingCode.pptx
+++ b/ClassMaterials/ObjectIntroAndMisc/Slides/Part1-DocumentingCode.pptx
@@ -424,7 +424,7 @@
           <a:p>
             <a:fld id="{73386005-8F80-1A49-87D1-22EBFA47E352}" type="datetimeFigureOut">
               <a:rPr lang="en-US" smtClean="0"/>
-              <a:t>12/3/2023</a:t>
+              <a:t>12/4/2023</a:t>
             </a:fld>
             <a:endParaRPr lang="en-US"/>
           </a:p>
@@ -1353,7 +1353,7 @@
           <a:p>
             <a:fld id="{5B07E745-2C70-2943-8487-A8F6E88ADF5E}" type="datetimeFigureOut">
               <a:rPr lang="en-US" smtClean="0"/>
-              <a:t>12/3/2023</a:t>
+              <a:t>12/4/2023</a:t>
             </a:fld>
             <a:endParaRPr lang="en-US"/>
           </a:p>
@@ -1521,7 +1521,7 @@
           <a:p>
             <a:fld id="{5B07E745-2C70-2943-8487-A8F6E88ADF5E}" type="datetimeFigureOut">
               <a:rPr lang="en-US" smtClean="0"/>
-              <a:t>12/3/2023</a:t>
+              <a:t>12/4/2023</a:t>
             </a:fld>
             <a:endParaRPr lang="en-US"/>
           </a:p>
@@ -1699,7 +1699,7 @@
           <a:p>
             <a:fld id="{5B07E745-2C70-2943-8487-A8F6E88ADF5E}" type="datetimeFigureOut">
               <a:rPr lang="en-US" smtClean="0"/>
-              <a:t>12/3/2023</a:t>
+              <a:t>12/4/2023</a:t>
             </a:fld>
             <a:endParaRPr lang="en-US"/>
           </a:p>
@@ -1867,7 +1867,7 @@
           <a:p>
             <a:fld id="{5B07E745-2C70-2943-8487-A8F6E88ADF5E}" type="datetimeFigureOut">
               <a:rPr lang="en-US" smtClean="0"/>
-              <a:t>12/3/2023</a:t>
+              <a:t>12/4/2023</a:t>
             </a:fld>
             <a:endParaRPr lang="en-US"/>
           </a:p>
@@ -2112,7 +2112,7 @@
           <a:p>
             <a:fld id="{5B07E745-2C70-2943-8487-A8F6E88ADF5E}" type="datetimeFigureOut">
               <a:rPr lang="en-US" smtClean="0"/>
-              <a:t>12/3/2023</a:t>
+              <a:t>12/4/2023</a:t>
             </a:fld>
             <a:endParaRPr lang="en-US"/>
           </a:p>
@@ -2397,7 +2397,7 @@
           <a:p>
             <a:fld id="{5B07E745-2C70-2943-8487-A8F6E88ADF5E}" type="datetimeFigureOut">
               <a:rPr lang="en-US" smtClean="0"/>
-              <a:t>12/3/2023</a:t>
+              <a:t>12/4/2023</a:t>
             </a:fld>
             <a:endParaRPr lang="en-US"/>
           </a:p>
@@ -2816,7 +2816,7 @@
           <a:p>
             <a:fld id="{5B07E745-2C70-2943-8487-A8F6E88ADF5E}" type="datetimeFigureOut">
               <a:rPr lang="en-US" smtClean="0"/>
-              <a:t>12/3/2023</a:t>
+              <a:t>12/4/2023</a:t>
             </a:fld>
             <a:endParaRPr lang="en-US"/>
           </a:p>
@@ -2933,7 +2933,7 @@
           <a:p>
             <a:fld id="{5B07E745-2C70-2943-8487-A8F6E88ADF5E}" type="datetimeFigureOut">
               <a:rPr lang="en-US" smtClean="0"/>
-              <a:t>12/3/2023</a:t>
+              <a:t>12/4/2023</a:t>
             </a:fld>
             <a:endParaRPr lang="en-US"/>
           </a:p>
@@ -3028,7 +3028,7 @@
           <a:p>
             <a:fld id="{5B07E745-2C70-2943-8487-A8F6E88ADF5E}" type="datetimeFigureOut">
               <a:rPr lang="en-US" smtClean="0"/>
-              <a:t>12/3/2023</a:t>
+              <a:t>12/4/2023</a:t>
             </a:fld>
             <a:endParaRPr lang="en-US"/>
           </a:p>
@@ -3303,7 +3303,7 @@
           <a:p>
             <a:fld id="{5B07E745-2C70-2943-8487-A8F6E88ADF5E}" type="datetimeFigureOut">
               <a:rPr lang="en-US" smtClean="0"/>
-              <a:t>12/3/2023</a:t>
+              <a:t>12/4/2023</a:t>
             </a:fld>
             <a:endParaRPr lang="en-US"/>
           </a:p>
@@ -3555,7 +3555,7 @@
           <a:p>
             <a:fld id="{5B07E745-2C70-2943-8487-A8F6E88ADF5E}" type="datetimeFigureOut">
               <a:rPr lang="en-US" smtClean="0"/>
-              <a:t>12/3/2023</a:t>
+              <a:t>12/4/2023</a:t>
             </a:fld>
             <a:endParaRPr lang="en-US"/>
           </a:p>
@@ -3766,7 +3766,7 @@
           <a:p>
             <a:fld id="{5B07E745-2C70-2943-8487-A8F6E88ADF5E}" type="datetimeFigureOut">
               <a:rPr lang="en-US" smtClean="0"/>
-              <a:t>12/3/2023</a:t>
+              <a:t>12/4/2023</a:t>
             </a:fld>
             <a:endParaRPr lang="en-US"/>
           </a:p>
@@ -4375,18 +4375,13 @@
           </a:p>
           <a:p>
             <a:r>
-              <a:rPr lang="en-US" sz="4400">
+              <a:rPr lang="en-US" sz="4400" dirty="0">
                 <a:highlight>
                   <a:srgbClr val="FFFF00"/>
                 </a:highlight>
               </a:rPr>
               <a:t>__________</a:t>
             </a:r>
-            <a:endParaRPr lang="en-US" sz="4400" dirty="0">
-              <a:highlight>
-                <a:srgbClr val="FFFF00"/>
-              </a:highlight>
-            </a:endParaRPr>
           </a:p>
         </p:txBody>
       </p:sp>
@@ -4887,7 +4882,7 @@
             <a:effectLst/>
             <a:extLst>
               <a:ext uri="{C572A759-6A51-4108-AA02-DFA0A04FC94B}">
-                <ma14:wrappingTextBoxFlag xmlns="" xmlns:ma14="http://schemas.microsoft.com/office/mac/drawingml/2011/main" val="1"/>
+                <ma14:wrappingTextBoxFlag xmlns:ma14="http://schemas.microsoft.com/office/mac/drawingml/2011/main" xmlns="" val="1"/>
               </a:ext>
             </a:extLst>
           </p:spPr>
@@ -5657,7 +5652,7 @@
           </a:ln>
           <a:extLst>
             <a:ext uri="{C572A759-6A51-4108-AA02-DFA0A04FC94B}">
-              <ma14:wrappingTextBoxFlag xmlns="" xmlns:ma14="http://schemas.microsoft.com/office/mac/drawingml/2011/main" val="1"/>
+              <ma14:wrappingTextBoxFlag xmlns:ma14="http://schemas.microsoft.com/office/mac/drawingml/2011/main" xmlns="" val="1"/>
             </a:ext>
           </a:extLst>
         </p:spPr>
@@ -6364,7 +6359,7 @@
             <a:effectLst/>
             <a:extLst>
               <a:ext uri="{C572A759-6A51-4108-AA02-DFA0A04FC94B}">
-                <ma14:wrappingTextBoxFlag xmlns="" xmlns:ma14="http://schemas.microsoft.com/office/mac/drawingml/2011/main" val="1"/>
+                <ma14:wrappingTextBoxFlag xmlns:ma14="http://schemas.microsoft.com/office/mac/drawingml/2011/main" xmlns="" val="1"/>
               </a:ext>
             </a:extLst>
           </p:spPr>
@@ -7284,21 +7279,6 @@
 </file>
 
 <file path=customXml/item1.xml><?xml version="1.0" encoding="utf-8"?>
-<?mso-contentType ?>
-<FormTemplates xmlns="http://schemas.microsoft.com/sharepoint/v3/contenttype/forms">
-  <Display>DocumentLibraryForm</Display>
-  <Edit>DocumentLibraryForm</Edit>
-  <New>DocumentLibraryForm</New>
-</FormTemplates>
-</file>
-
-<file path=customXml/item2.xml><?xml version="1.0" encoding="utf-8"?>
-<p:properties xmlns:p="http://schemas.microsoft.com/office/2006/metadata/properties" xmlns:xsi="http://www.w3.org/2001/XMLSchema-instance" xmlns:pc="http://schemas.microsoft.com/office/infopath/2007/PartnerControls">
-  <documentManagement/>
-</p:properties>
-</file>
-
-<file path=customXml/item3.xml><?xml version="1.0" encoding="utf-8"?>
 <ct:contentTypeSchema xmlns:ct="http://schemas.microsoft.com/office/2006/metadata/contentType" xmlns:ma="http://schemas.microsoft.com/office/2006/metadata/properties/metaAttributes" ct:_="" ma:_="" ma:contentTypeName="Document" ma:contentTypeID="0x0101004285D81DBE5F5A448E892B34D6B8CF20" ma:contentTypeVersion="2" ma:contentTypeDescription="Create a new document." ma:contentTypeScope="" ma:versionID="026ccaf10de5d9915dfa48c6db16b59b">
   <xsd:schema xmlns:xsd="http://www.w3.org/2001/XMLSchema" xmlns:xs="http://www.w3.org/2001/XMLSchema" xmlns:p="http://schemas.microsoft.com/office/2006/metadata/properties" xmlns:ns2="08600313-7276-4ca7-b5d3-7d86193ee0ac" targetNamespace="http://schemas.microsoft.com/office/2006/metadata/properties" ma:root="true" ma:fieldsID="c887e4ee215f388544e22a2030d7ea35" ns2:_="">
     <xsd:import namespace="08600313-7276-4ca7-b5d3-7d86193ee0ac"/>
@@ -7430,24 +7410,22 @@
 </ct:contentTypeSchema>
 </file>
 
-<file path=customXml/itemProps1.xml><?xml version="1.0" encoding="utf-8"?>
-<ds:datastoreItem xmlns:ds="http://schemas.openxmlformats.org/officeDocument/2006/customXml" ds:itemID="{F6D2D98F-7772-4D77-9EAD-84CA989E91DC}">
-  <ds:schemaRefs>
-    <ds:schemaRef ds:uri="http://schemas.microsoft.com/sharepoint/v3/contenttype/forms"/>
-  </ds:schemaRefs>
-</ds:datastoreItem>
+<file path=customXml/item2.xml><?xml version="1.0" encoding="utf-8"?>
+<p:properties xmlns:p="http://schemas.microsoft.com/office/2006/metadata/properties" xmlns:xsi="http://www.w3.org/2001/XMLSchema-instance" xmlns:pc="http://schemas.microsoft.com/office/infopath/2007/PartnerControls">
+  <documentManagement/>
+</p:properties>
 </file>
 
-<file path=customXml/itemProps2.xml><?xml version="1.0" encoding="utf-8"?>
-<ds:datastoreItem xmlns:ds="http://schemas.openxmlformats.org/officeDocument/2006/customXml" ds:itemID="{F97763C6-34AC-4EBA-9781-B781EFEF16EB}">
-  <ds:schemaRefs>
-    <ds:schemaRef ds:uri="http://schemas.microsoft.com/office/2006/metadata/properties"/>
-    <ds:schemaRef ds:uri="http://schemas.microsoft.com/office/infopath/2007/PartnerControls"/>
-  </ds:schemaRefs>
-</ds:datastoreItem>
+<file path=customXml/item3.xml><?xml version="1.0" encoding="utf-8"?>
+<?mso-contentType ?>
+<FormTemplates xmlns="http://schemas.microsoft.com/sharepoint/v3/contenttype/forms">
+  <Display>DocumentLibraryForm</Display>
+  <Edit>DocumentLibraryForm</Edit>
+  <New>DocumentLibraryForm</New>
+</FormTemplates>
 </file>
 
-<file path=customXml/itemProps3.xml><?xml version="1.0" encoding="utf-8"?>
+<file path=customXml/itemProps1.xml><?xml version="1.0" encoding="utf-8"?>
 <ds:datastoreItem xmlns:ds="http://schemas.openxmlformats.org/officeDocument/2006/customXml" ds:itemID="{6C423C04-D2F3-4811-BE3A-D038CC72103B}">
   <ds:schemaRefs>
     <ds:schemaRef ds:uri="http://schemas.microsoft.com/office/2006/metadata/contentType"/>
@@ -7463,4 +7441,21 @@
     <ds:schemaRef ds:uri="http://schemas.microsoft.com/internal/obd"/>
   </ds:schemaRefs>
 </ds:datastoreItem>
+</file>
+
+<file path=customXml/itemProps2.xml><?xml version="1.0" encoding="utf-8"?>
+<ds:datastoreItem xmlns:ds="http://schemas.openxmlformats.org/officeDocument/2006/customXml" ds:itemID="{F97763C6-34AC-4EBA-9781-B781EFEF16EB}">
+  <ds:schemaRefs>
+    <ds:schemaRef ds:uri="http://schemas.microsoft.com/office/2006/metadata/properties"/>
+    <ds:schemaRef ds:uri="http://schemas.microsoft.com/office/infopath/2007/PartnerControls"/>
+  </ds:schemaRefs>
+</ds:datastoreItem>
+</file>
+
+<file path=customXml/itemProps3.xml><?xml version="1.0" encoding="utf-8"?>
+<ds:datastoreItem xmlns:ds="http://schemas.openxmlformats.org/officeDocument/2006/customXml" ds:itemID="{F6D2D98F-7772-4D77-9EAD-84CA989E91DC}">
+  <ds:schemaRefs>
+    <ds:schemaRef ds:uri="http://schemas.microsoft.com/sharepoint/v3/contenttype/forms"/>
+  </ds:schemaRefs>
+</ds:datastoreItem>
 </file>
</xml_diff>

<commit_message>
Fix solution project name in ObjectIntro slides
</commit_message>
<xml_diff>
--- a/ClassMaterials/ObjectIntroAndMisc/Slides/Part1-DocumentingCode.pptx
+++ b/ClassMaterials/ObjectIntroAndMisc/Slides/Part1-DocumentingCode.pptx
@@ -424,7 +424,7 @@
           <a:p>
             <a:fld id="{73386005-8F80-1A49-87D1-22EBFA47E352}" type="datetimeFigureOut">
               <a:rPr lang="en-US" smtClean="0"/>
-              <a:t>12/4/2023</a:t>
+              <a:t>9/9/2024</a:t>
             </a:fld>
             <a:endParaRPr lang="en-US"/>
           </a:p>
@@ -1353,7 +1353,7 @@
           <a:p>
             <a:fld id="{5B07E745-2C70-2943-8487-A8F6E88ADF5E}" type="datetimeFigureOut">
               <a:rPr lang="en-US" smtClean="0"/>
-              <a:t>12/4/2023</a:t>
+              <a:t>9/9/2024</a:t>
             </a:fld>
             <a:endParaRPr lang="en-US"/>
           </a:p>
@@ -1521,7 +1521,7 @@
           <a:p>
             <a:fld id="{5B07E745-2C70-2943-8487-A8F6E88ADF5E}" type="datetimeFigureOut">
               <a:rPr lang="en-US" smtClean="0"/>
-              <a:t>12/4/2023</a:t>
+              <a:t>9/9/2024</a:t>
             </a:fld>
             <a:endParaRPr lang="en-US"/>
           </a:p>
@@ -1699,7 +1699,7 @@
           <a:p>
             <a:fld id="{5B07E745-2C70-2943-8487-A8F6E88ADF5E}" type="datetimeFigureOut">
               <a:rPr lang="en-US" smtClean="0"/>
-              <a:t>12/4/2023</a:t>
+              <a:t>9/9/2024</a:t>
             </a:fld>
             <a:endParaRPr lang="en-US"/>
           </a:p>
@@ -1867,7 +1867,7 @@
           <a:p>
             <a:fld id="{5B07E745-2C70-2943-8487-A8F6E88ADF5E}" type="datetimeFigureOut">
               <a:rPr lang="en-US" smtClean="0"/>
-              <a:t>12/4/2023</a:t>
+              <a:t>9/9/2024</a:t>
             </a:fld>
             <a:endParaRPr lang="en-US"/>
           </a:p>
@@ -2112,7 +2112,7 @@
           <a:p>
             <a:fld id="{5B07E745-2C70-2943-8487-A8F6E88ADF5E}" type="datetimeFigureOut">
               <a:rPr lang="en-US" smtClean="0"/>
-              <a:t>12/4/2023</a:t>
+              <a:t>9/9/2024</a:t>
             </a:fld>
             <a:endParaRPr lang="en-US"/>
           </a:p>
@@ -2397,7 +2397,7 @@
           <a:p>
             <a:fld id="{5B07E745-2C70-2943-8487-A8F6E88ADF5E}" type="datetimeFigureOut">
               <a:rPr lang="en-US" smtClean="0"/>
-              <a:t>12/4/2023</a:t>
+              <a:t>9/9/2024</a:t>
             </a:fld>
             <a:endParaRPr lang="en-US"/>
           </a:p>
@@ -2816,7 +2816,7 @@
           <a:p>
             <a:fld id="{5B07E745-2C70-2943-8487-A8F6E88ADF5E}" type="datetimeFigureOut">
               <a:rPr lang="en-US" smtClean="0"/>
-              <a:t>12/4/2023</a:t>
+              <a:t>9/9/2024</a:t>
             </a:fld>
             <a:endParaRPr lang="en-US"/>
           </a:p>
@@ -2933,7 +2933,7 @@
           <a:p>
             <a:fld id="{5B07E745-2C70-2943-8487-A8F6E88ADF5E}" type="datetimeFigureOut">
               <a:rPr lang="en-US" smtClean="0"/>
-              <a:t>12/4/2023</a:t>
+              <a:t>9/9/2024</a:t>
             </a:fld>
             <a:endParaRPr lang="en-US"/>
           </a:p>
@@ -3028,7 +3028,7 @@
           <a:p>
             <a:fld id="{5B07E745-2C70-2943-8487-A8F6E88ADF5E}" type="datetimeFigureOut">
               <a:rPr lang="en-US" smtClean="0"/>
-              <a:t>12/4/2023</a:t>
+              <a:t>9/9/2024</a:t>
             </a:fld>
             <a:endParaRPr lang="en-US"/>
           </a:p>
@@ -3303,7 +3303,7 @@
           <a:p>
             <a:fld id="{5B07E745-2C70-2943-8487-A8F6E88ADF5E}" type="datetimeFigureOut">
               <a:rPr lang="en-US" smtClean="0"/>
-              <a:t>12/4/2023</a:t>
+              <a:t>9/9/2024</a:t>
             </a:fld>
             <a:endParaRPr lang="en-US"/>
           </a:p>
@@ -3555,7 +3555,7 @@
           <a:p>
             <a:fld id="{5B07E745-2C70-2943-8487-A8F6E88ADF5E}" type="datetimeFigureOut">
               <a:rPr lang="en-US" smtClean="0"/>
-              <a:t>12/4/2023</a:t>
+              <a:t>9/9/2024</a:t>
             </a:fld>
             <a:endParaRPr lang="en-US"/>
           </a:p>
@@ -3766,7 +3766,7 @@
           <a:p>
             <a:fld id="{5B07E745-2C70-2943-8487-A8F6E88ADF5E}" type="datetimeFigureOut">
               <a:rPr lang="en-US" smtClean="0"/>
-              <a:t>12/4/2023</a:t>
+              <a:t>9/9/2024</a:t>
             </a:fld>
             <a:endParaRPr lang="en-US"/>
           </a:p>
@@ -4259,7 +4259,7 @@
             </a:pPr>
             <a:r>
               <a:rPr lang="en-US" sz="2400" i="1" dirty="0" err="1"/>
-              <a:t>PracticeObjectIntroAndMiscSolution</a:t>
+              <a:t>PracticeSolutionObjectIntroAndMisc</a:t>
             </a:r>
             <a:endParaRPr lang="en-US" sz="2400" i="1" dirty="0"/>
           </a:p>
@@ -4882,7 +4882,7 @@
             <a:effectLst/>
             <a:extLst>
               <a:ext uri="{C572A759-6A51-4108-AA02-DFA0A04FC94B}">
-                <ma14:wrappingTextBoxFlag xmlns:ma14="http://schemas.microsoft.com/office/mac/drawingml/2011/main" xmlns="" val="1"/>
+                <ma14:wrappingTextBoxFlag xmlns="" xmlns:ma14="http://schemas.microsoft.com/office/mac/drawingml/2011/main" val="1"/>
               </a:ext>
             </a:extLst>
           </p:spPr>
@@ -5652,7 +5652,7 @@
           </a:ln>
           <a:extLst>
             <a:ext uri="{C572A759-6A51-4108-AA02-DFA0A04FC94B}">
-              <ma14:wrappingTextBoxFlag xmlns:ma14="http://schemas.microsoft.com/office/mac/drawingml/2011/main" xmlns="" val="1"/>
+              <ma14:wrappingTextBoxFlag xmlns="" xmlns:ma14="http://schemas.microsoft.com/office/mac/drawingml/2011/main" val="1"/>
             </a:ext>
           </a:extLst>
         </p:spPr>
@@ -6359,7 +6359,7 @@
             <a:effectLst/>
             <a:extLst>
               <a:ext uri="{C572A759-6A51-4108-AA02-DFA0A04FC94B}">
-                <ma14:wrappingTextBoxFlag xmlns:ma14="http://schemas.microsoft.com/office/mac/drawingml/2011/main" xmlns="" val="1"/>
+                <ma14:wrappingTextBoxFlag xmlns="" xmlns:ma14="http://schemas.microsoft.com/office/mac/drawingml/2011/main" val="1"/>
               </a:ext>
             </a:extLst>
           </p:spPr>
@@ -7279,6 +7279,21 @@
 </file>
 
 <file path=customXml/item1.xml><?xml version="1.0" encoding="utf-8"?>
+<?mso-contentType ?>
+<FormTemplates xmlns="http://schemas.microsoft.com/sharepoint/v3/contenttype/forms">
+  <Display>DocumentLibraryForm</Display>
+  <Edit>DocumentLibraryForm</Edit>
+  <New>DocumentLibraryForm</New>
+</FormTemplates>
+</file>
+
+<file path=customXml/item2.xml><?xml version="1.0" encoding="utf-8"?>
+<p:properties xmlns:p="http://schemas.microsoft.com/office/2006/metadata/properties" xmlns:xsi="http://www.w3.org/2001/XMLSchema-instance" xmlns:pc="http://schemas.microsoft.com/office/infopath/2007/PartnerControls">
+  <documentManagement/>
+</p:properties>
+</file>
+
+<file path=customXml/item3.xml><?xml version="1.0" encoding="utf-8"?>
 <ct:contentTypeSchema xmlns:ct="http://schemas.microsoft.com/office/2006/metadata/contentType" xmlns:ma="http://schemas.microsoft.com/office/2006/metadata/properties/metaAttributes" ct:_="" ma:_="" ma:contentTypeName="Document" ma:contentTypeID="0x0101004285D81DBE5F5A448E892B34D6B8CF20" ma:contentTypeVersion="2" ma:contentTypeDescription="Create a new document." ma:contentTypeScope="" ma:versionID="026ccaf10de5d9915dfa48c6db16b59b">
   <xsd:schema xmlns:xsd="http://www.w3.org/2001/XMLSchema" xmlns:xs="http://www.w3.org/2001/XMLSchema" xmlns:p="http://schemas.microsoft.com/office/2006/metadata/properties" xmlns:ns2="08600313-7276-4ca7-b5d3-7d86193ee0ac" targetNamespace="http://schemas.microsoft.com/office/2006/metadata/properties" ma:root="true" ma:fieldsID="c887e4ee215f388544e22a2030d7ea35" ns2:_="">
     <xsd:import namespace="08600313-7276-4ca7-b5d3-7d86193ee0ac"/>
@@ -7410,22 +7425,24 @@
 </ct:contentTypeSchema>
 </file>
 
-<file path=customXml/item2.xml><?xml version="1.0" encoding="utf-8"?>
-<p:properties xmlns:p="http://schemas.microsoft.com/office/2006/metadata/properties" xmlns:xsi="http://www.w3.org/2001/XMLSchema-instance" xmlns:pc="http://schemas.microsoft.com/office/infopath/2007/PartnerControls">
-  <documentManagement/>
-</p:properties>
+<file path=customXml/itemProps1.xml><?xml version="1.0" encoding="utf-8"?>
+<ds:datastoreItem xmlns:ds="http://schemas.openxmlformats.org/officeDocument/2006/customXml" ds:itemID="{F6D2D98F-7772-4D77-9EAD-84CA989E91DC}">
+  <ds:schemaRefs>
+    <ds:schemaRef ds:uri="http://schemas.microsoft.com/sharepoint/v3/contenttype/forms"/>
+  </ds:schemaRefs>
+</ds:datastoreItem>
 </file>
 
-<file path=customXml/item3.xml><?xml version="1.0" encoding="utf-8"?>
-<?mso-contentType ?>
-<FormTemplates xmlns="http://schemas.microsoft.com/sharepoint/v3/contenttype/forms">
-  <Display>DocumentLibraryForm</Display>
-  <Edit>DocumentLibraryForm</Edit>
-  <New>DocumentLibraryForm</New>
-</FormTemplates>
+<file path=customXml/itemProps2.xml><?xml version="1.0" encoding="utf-8"?>
+<ds:datastoreItem xmlns:ds="http://schemas.openxmlformats.org/officeDocument/2006/customXml" ds:itemID="{F97763C6-34AC-4EBA-9781-B781EFEF16EB}">
+  <ds:schemaRefs>
+    <ds:schemaRef ds:uri="http://schemas.microsoft.com/office/2006/metadata/properties"/>
+    <ds:schemaRef ds:uri="http://schemas.microsoft.com/office/infopath/2007/PartnerControls"/>
+  </ds:schemaRefs>
+</ds:datastoreItem>
 </file>
 
-<file path=customXml/itemProps1.xml><?xml version="1.0" encoding="utf-8"?>
+<file path=customXml/itemProps3.xml><?xml version="1.0" encoding="utf-8"?>
 <ds:datastoreItem xmlns:ds="http://schemas.openxmlformats.org/officeDocument/2006/customXml" ds:itemID="{6C423C04-D2F3-4811-BE3A-D038CC72103B}">
   <ds:schemaRefs>
     <ds:schemaRef ds:uri="http://schemas.microsoft.com/office/2006/metadata/contentType"/>
@@ -7441,21 +7458,4 @@
     <ds:schemaRef ds:uri="http://schemas.microsoft.com/internal/obd"/>
   </ds:schemaRefs>
 </ds:datastoreItem>
-</file>
-
-<file path=customXml/itemProps2.xml><?xml version="1.0" encoding="utf-8"?>
-<ds:datastoreItem xmlns:ds="http://schemas.openxmlformats.org/officeDocument/2006/customXml" ds:itemID="{F97763C6-34AC-4EBA-9781-B781EFEF16EB}">
-  <ds:schemaRefs>
-    <ds:schemaRef ds:uri="http://schemas.microsoft.com/office/2006/metadata/properties"/>
-    <ds:schemaRef ds:uri="http://schemas.microsoft.com/office/infopath/2007/PartnerControls"/>
-  </ds:schemaRefs>
-</ds:datastoreItem>
-</file>
-
-<file path=customXml/itemProps3.xml><?xml version="1.0" encoding="utf-8"?>
-<ds:datastoreItem xmlns:ds="http://schemas.openxmlformats.org/officeDocument/2006/customXml" ds:itemID="{F6D2D98F-7772-4D77-9EAD-84CA989E91DC}">
-  <ds:schemaRefs>
-    <ds:schemaRef ds:uri="http://schemas.microsoft.com/sharepoint/v3/contenttype/forms"/>
-  </ds:schemaRefs>
-</ds:datastoreItem>
 </file>
</xml_diff>